<commit_message>
finished the how claims are paid slides
</commit_message>
<xml_diff>
--- a/PowerPoints/Phase 3 - Claims Terminology/010 How are Claims Paid.pptx
+++ b/PowerPoints/Phase 3 - Claims Terminology/010 How are Claims Paid.pptx
@@ -7,16 +7,16 @@
   </p:sldMasterIdLst>
   <p:sldIdLst>
     <p:sldId id="256" r:id="rId3"/>
-    <p:sldId id="257" r:id="rId4"/>
-    <p:sldId id="258" r:id="rId5"/>
-    <p:sldId id="259" r:id="rId6"/>
-    <p:sldId id="260" r:id="rId7"/>
-    <p:sldId id="262" r:id="rId8"/>
-    <p:sldId id="263" r:id="rId9"/>
-    <p:sldId id="264" r:id="rId10"/>
-    <p:sldId id="265" r:id="rId11"/>
-    <p:sldId id="266" r:id="rId12"/>
-    <p:sldId id="267" r:id="rId13"/>
+    <p:sldId id="273" r:id="rId4"/>
+    <p:sldId id="272" r:id="rId5"/>
+    <p:sldId id="271" r:id="rId6"/>
+    <p:sldId id="268" r:id="rId7"/>
+    <p:sldId id="269" r:id="rId8"/>
+    <p:sldId id="270" r:id="rId9"/>
+    <p:sldId id="257" r:id="rId10"/>
+    <p:sldId id="258" r:id="rId11"/>
+    <p:sldId id="259" r:id="rId12"/>
+    <p:sldId id="260" r:id="rId13"/>
     <p:sldId id="261" r:id="rId14"/>
   </p:sldIdLst>
   <p:sldSz cx="12192000" cy="6858000"/>
@@ -261,7 +261,7 @@
           <a:p>
             <a:fld id="{FF632088-7E42-4B13-8645-6CA4616862AF}" type="datetimeFigureOut">
               <a:rPr lang="en-US" smtClean="0"/>
-              <a:t>3/3/2016</a:t>
+              <a:t>3/4/2016</a:t>
             </a:fld>
             <a:endParaRPr lang="en-US"/>
           </a:p>
@@ -431,7 +431,7 @@
           <a:p>
             <a:fld id="{FF632088-7E42-4B13-8645-6CA4616862AF}" type="datetimeFigureOut">
               <a:rPr lang="en-US" smtClean="0"/>
-              <a:t>3/3/2016</a:t>
+              <a:t>3/4/2016</a:t>
             </a:fld>
             <a:endParaRPr lang="en-US"/>
           </a:p>
@@ -611,7 +611,7 @@
           <a:p>
             <a:fld id="{FF632088-7E42-4B13-8645-6CA4616862AF}" type="datetimeFigureOut">
               <a:rPr lang="en-US" smtClean="0"/>
-              <a:t>3/3/2016</a:t>
+              <a:t>3/4/2016</a:t>
             </a:fld>
             <a:endParaRPr lang="en-US"/>
           </a:p>
@@ -811,7 +811,7 @@
           <a:p>
             <a:fld id="{FF632088-7E42-4B13-8645-6CA4616862AF}" type="datetimeFigureOut">
               <a:rPr lang="en-US" smtClean="0"/>
-              <a:t>3/3/2016</a:t>
+              <a:t>3/4/2016</a:t>
             </a:fld>
             <a:endParaRPr lang="en-US"/>
           </a:p>
@@ -1028,7 +1028,7 @@
           <a:p>
             <a:fld id="{FF632088-7E42-4B13-8645-6CA4616862AF}" type="datetimeFigureOut">
               <a:rPr lang="en-US" smtClean="0"/>
-              <a:t>3/3/2016</a:t>
+              <a:t>3/4/2016</a:t>
             </a:fld>
             <a:endParaRPr lang="en-US"/>
           </a:p>
@@ -1313,7 +1313,7 @@
           <a:p>
             <a:fld id="{FF632088-7E42-4B13-8645-6CA4616862AF}" type="datetimeFigureOut">
               <a:rPr lang="en-US" smtClean="0"/>
-              <a:t>3/3/2016</a:t>
+              <a:t>3/4/2016</a:t>
             </a:fld>
             <a:endParaRPr lang="en-US"/>
           </a:p>
@@ -1587,7 +1587,7 @@
           <a:p>
             <a:fld id="{FF632088-7E42-4B13-8645-6CA4616862AF}" type="datetimeFigureOut">
               <a:rPr lang="en-US" smtClean="0"/>
-              <a:t>3/3/2016</a:t>
+              <a:t>3/4/2016</a:t>
             </a:fld>
             <a:endParaRPr lang="en-US"/>
           </a:p>
@@ -1684,7 +1684,7 @@
   </p:clrMapOvr>
   <p:extLst>
     <p:ext uri="{DCECCB84-F9BA-43D5-87BE-67443E8EF086}">
-      <p15:sldGuideLst xmlns:p15="http://schemas.microsoft.com/office/powerpoint/2012/main" xmlns=""/>
+      <p15:sldGuideLst xmlns="" xmlns:p15="http://schemas.microsoft.com/office/powerpoint/2012/main"/>
     </p:ext>
   </p:extLst>
 </p:sldLayout>
@@ -2014,7 +2014,7 @@
           <a:p>
             <a:fld id="{FF632088-7E42-4B13-8645-6CA4616862AF}" type="datetimeFigureOut">
               <a:rPr lang="en-US" smtClean="0"/>
-              <a:t>3/3/2016</a:t>
+              <a:t>3/4/2016</a:t>
             </a:fld>
             <a:endParaRPr lang="en-US"/>
           </a:p>
@@ -2111,7 +2111,7 @@
   </p:clrMapOvr>
   <p:extLst>
     <p:ext uri="{DCECCB84-F9BA-43D5-87BE-67443E8EF086}">
-      <p15:sldGuideLst xmlns:p15="http://schemas.microsoft.com/office/powerpoint/2012/main" xmlns=""/>
+      <p15:sldGuideLst xmlns="" xmlns:p15="http://schemas.microsoft.com/office/powerpoint/2012/main"/>
     </p:ext>
   </p:extLst>
 </p:sldLayout>
@@ -2174,7 +2174,7 @@
           <a:p>
             <a:fld id="{FF632088-7E42-4B13-8645-6CA4616862AF}" type="datetimeFigureOut">
               <a:rPr lang="en-US" smtClean="0"/>
-              <a:t>3/3/2016</a:t>
+              <a:t>3/4/2016</a:t>
             </a:fld>
             <a:endParaRPr lang="en-US"/>
           </a:p>
@@ -2306,7 +2306,7 @@
           <a:p>
             <a:fld id="{FF632088-7E42-4B13-8645-6CA4616862AF}" type="datetimeFigureOut">
               <a:rPr lang="en-US" smtClean="0"/>
-              <a:t>3/3/2016</a:t>
+              <a:t>3/4/2016</a:t>
             </a:fld>
             <a:endParaRPr lang="en-US"/>
           </a:p>
@@ -2557,7 +2557,7 @@
           <a:p>
             <a:fld id="{FF632088-7E42-4B13-8645-6CA4616862AF}" type="datetimeFigureOut">
               <a:rPr lang="en-US" smtClean="0"/>
-              <a:t>3/3/2016</a:t>
+              <a:t>3/4/2016</a:t>
             </a:fld>
             <a:endParaRPr lang="en-US"/>
           </a:p>
@@ -2654,7 +2654,7 @@
   </p:clrMapOvr>
   <p:extLst>
     <p:ext uri="{DCECCB84-F9BA-43D5-87BE-67443E8EF086}">
-      <p15:sldGuideLst xmlns:p15="http://schemas.microsoft.com/office/powerpoint/2012/main" xmlns=""/>
+      <p15:sldGuideLst xmlns="" xmlns:p15="http://schemas.microsoft.com/office/powerpoint/2012/main"/>
     </p:ext>
   </p:extLst>
 </p:sldLayout>
@@ -2769,7 +2769,7 @@
           <a:p>
             <a:fld id="{FF632088-7E42-4B13-8645-6CA4616862AF}" type="datetimeFigureOut">
               <a:rPr lang="en-US" smtClean="0"/>
-              <a:t>3/3/2016</a:t>
+              <a:t>3/4/2016</a:t>
             </a:fld>
             <a:endParaRPr lang="en-US"/>
           </a:p>
@@ -3187,7 +3187,7 @@
           <a:p>
             <a:fld id="{FF632088-7E42-4B13-8645-6CA4616862AF}" type="datetimeFigureOut">
               <a:rPr lang="en-US" smtClean="0"/>
-              <a:t>3/3/2016</a:t>
+              <a:t>3/4/2016</a:t>
             </a:fld>
             <a:endParaRPr lang="en-US"/>
           </a:p>
@@ -3399,7 +3399,7 @@
           <a:p>
             <a:fld id="{FF632088-7E42-4B13-8645-6CA4616862AF}" type="datetimeFigureOut">
               <a:rPr lang="en-US" smtClean="0"/>
-              <a:t>3/3/2016</a:t>
+              <a:t>3/4/2016</a:t>
             </a:fld>
             <a:endParaRPr lang="en-US"/>
           </a:p>
@@ -3620,7 +3620,7 @@
           <a:p>
             <a:fld id="{FF632088-7E42-4B13-8645-6CA4616862AF}" type="datetimeFigureOut">
               <a:rPr lang="en-US" smtClean="0"/>
-              <a:t>3/3/2016</a:t>
+              <a:t>3/4/2016</a:t>
             </a:fld>
             <a:endParaRPr lang="en-US"/>
           </a:p>
@@ -3908,7 +3908,7 @@
           <a:p>
             <a:fld id="{FF632088-7E42-4B13-8645-6CA4616862AF}" type="datetimeFigureOut">
               <a:rPr lang="en-US" smtClean="0"/>
-              <a:t>3/3/2016</a:t>
+              <a:t>3/4/2016</a:t>
             </a:fld>
             <a:endParaRPr lang="en-US"/>
           </a:p>
@@ -4140,7 +4140,7 @@
           <a:p>
             <a:fld id="{FF632088-7E42-4B13-8645-6CA4616862AF}" type="datetimeFigureOut">
               <a:rPr lang="en-US" smtClean="0"/>
-              <a:t>3/3/2016</a:t>
+              <a:t>3/4/2016</a:t>
             </a:fld>
             <a:endParaRPr lang="en-US"/>
           </a:p>
@@ -4200,7 +4200,7 @@
   </p:clrMapOvr>
   <p:extLst>
     <p:ext uri="{DCECCB84-F9BA-43D5-87BE-67443E8EF086}">
-      <p15:sldGuideLst xmlns:p15="http://schemas.microsoft.com/office/powerpoint/2012/main" xmlns=""/>
+      <p15:sldGuideLst xmlns="" xmlns:p15="http://schemas.microsoft.com/office/powerpoint/2012/main"/>
     </p:ext>
   </p:extLst>
 </p:sldLayout>
@@ -4492,7 +4492,7 @@
           <a:p>
             <a:fld id="{FF632088-7E42-4B13-8645-6CA4616862AF}" type="datetimeFigureOut">
               <a:rPr lang="en-US" smtClean="0"/>
-              <a:t>3/3/2016</a:t>
+              <a:t>3/4/2016</a:t>
             </a:fld>
             <a:endParaRPr lang="en-US"/>
           </a:p>
@@ -4575,7 +4575,7 @@
   </p:clrMapOvr>
   <p:extLst>
     <p:ext uri="{DCECCB84-F9BA-43D5-87BE-67443E8EF086}">
-      <p15:sldGuideLst xmlns:p15="http://schemas.microsoft.com/office/powerpoint/2012/main" xmlns=""/>
+      <p15:sldGuideLst xmlns="" xmlns:p15="http://schemas.microsoft.com/office/powerpoint/2012/main"/>
     </p:ext>
   </p:extLst>
 </p:sldLayout>
@@ -4615,7 +4615,7 @@
           <a:p>
             <a:fld id="{FF632088-7E42-4B13-8645-6CA4616862AF}" type="datetimeFigureOut">
               <a:rPr lang="en-US" smtClean="0"/>
-              <a:t>3/3/2016</a:t>
+              <a:t>3/4/2016</a:t>
             </a:fld>
             <a:endParaRPr lang="en-US"/>
           </a:p>
@@ -4733,7 +4733,7 @@
           <a:p>
             <a:fld id="{FF632088-7E42-4B13-8645-6CA4616862AF}" type="datetimeFigureOut">
               <a:rPr lang="en-US" smtClean="0"/>
-              <a:t>3/3/2016</a:t>
+              <a:t>3/4/2016</a:t>
             </a:fld>
             <a:endParaRPr lang="en-US"/>
           </a:p>
@@ -5017,7 +5017,7 @@
           <a:p>
             <a:fld id="{FF632088-7E42-4B13-8645-6CA4616862AF}" type="datetimeFigureOut">
               <a:rPr lang="en-US" smtClean="0"/>
-              <a:t>3/3/2016</a:t>
+              <a:t>3/4/2016</a:t>
             </a:fld>
             <a:endParaRPr lang="en-US"/>
           </a:p>
@@ -5077,7 +5077,7 @@
   </p:clrMapOvr>
   <p:extLst>
     <p:ext uri="{DCECCB84-F9BA-43D5-87BE-67443E8EF086}">
-      <p15:sldGuideLst xmlns:p15="http://schemas.microsoft.com/office/powerpoint/2012/main" xmlns=""/>
+      <p15:sldGuideLst xmlns="" xmlns:p15="http://schemas.microsoft.com/office/powerpoint/2012/main"/>
     </p:ext>
   </p:extLst>
 </p:sldLayout>
@@ -5286,7 +5286,7 @@
           <a:p>
             <a:fld id="{FF632088-7E42-4B13-8645-6CA4616862AF}" type="datetimeFigureOut">
               <a:rPr lang="en-US" smtClean="0"/>
-              <a:t>3/3/2016</a:t>
+              <a:t>3/4/2016</a:t>
             </a:fld>
             <a:endParaRPr lang="en-US"/>
           </a:p>
@@ -5500,7 +5500,7 @@
           <a:p>
             <a:fld id="{FF632088-7E42-4B13-8645-6CA4616862AF}" type="datetimeFigureOut">
               <a:rPr lang="en-US" smtClean="0"/>
-              <a:t>3/3/2016</a:t>
+              <a:t>3/4/2016</a:t>
             </a:fld>
             <a:endParaRPr lang="en-US"/>
           </a:p>
@@ -5876,7 +5876,7 @@
   </p:txStyles>
   <p:extLst>
     <p:ext uri="{27BBF7A9-308A-43DC-89C8-2F10F3537804}">
-      <p15:sldGuideLst xmlns:p15="http://schemas.microsoft.com/office/powerpoint/2012/main" xmlns=""/>
+      <p15:sldGuideLst xmlns="" xmlns:p15="http://schemas.microsoft.com/office/powerpoint/2012/main"/>
     </p:ext>
   </p:extLst>
 </p:sldMaster>
@@ -6105,7 +6105,7 @@
           <a:p>
             <a:fld id="{FF632088-7E42-4B13-8645-6CA4616862AF}" type="datetimeFigureOut">
               <a:rPr lang="en-US" smtClean="0"/>
-              <a:t>3/3/2016</a:t>
+              <a:t>3/4/2016</a:t>
             </a:fld>
             <a:endParaRPr lang="en-US"/>
           </a:p>
@@ -6573,7 +6573,7 @@
   </p:txStyles>
   <p:extLst>
     <p:ext uri="{27BBF7A9-308A-43DC-89C8-2F10F3537804}">
-      <p15:sldGuideLst xmlns:p15="http://schemas.microsoft.com/office/powerpoint/2012/main" xmlns=""/>
+      <p15:sldGuideLst xmlns="" xmlns:p15="http://schemas.microsoft.com/office/powerpoint/2012/main"/>
     </p:ext>
   </p:extLst>
 </p:sldMaster>
@@ -6697,7 +6697,11 @@
           <a:bodyPr/>
           <a:lstStyle/>
           <a:p>
-            <a:endParaRPr lang="en-US"/>
+            <a:r>
+              <a:rPr lang="en-US" dirty="0" smtClean="0"/>
+              <a:t>Coinsurance</a:t>
+            </a:r>
+            <a:endParaRPr lang="en-US" dirty="0"/>
           </a:p>
         </p:txBody>
       </p:sp>
@@ -6716,14 +6720,24 @@
           <a:bodyPr/>
           <a:lstStyle/>
           <a:p>
-            <a:endParaRPr lang="en-US"/>
+            <a:r>
+              <a:rPr lang="en-US" dirty="0" smtClean="0"/>
+              <a:t>Coinsurance is a form of member cost sharing where the member pays a fixed percent of each medical bill.</a:t>
+            </a:r>
+          </a:p>
+          <a:p>
+            <a:r>
+              <a:rPr lang="en-US" dirty="0" smtClean="0"/>
+              <a:t>Coinsurance policies allow member to pay a higher share of their medical bills in exchange for lower monthly premiums.</a:t>
+            </a:r>
+            <a:endParaRPr lang="en-US" dirty="0"/>
           </a:p>
         </p:txBody>
       </p:sp>
     </p:spTree>
     <p:extLst>
       <p:ext uri="{BB962C8B-B14F-4D97-AF65-F5344CB8AC3E}">
-        <p14:creationId xmlns:p14="http://schemas.microsoft.com/office/powerpoint/2010/main" val="3324230771"/>
+        <p14:creationId xmlns:p14="http://schemas.microsoft.com/office/powerpoint/2010/main" val="3400448223"/>
       </p:ext>
     </p:extLst>
   </p:cSld>
@@ -6765,6 +6779,10 @@
           <a:bodyPr/>
           <a:lstStyle/>
           <a:p>
+            <a:r>
+              <a:rPr lang="en-US" smtClean="0"/>
+              <a:t>Out-of-Pocket Maximums</a:t>
+            </a:r>
             <a:endParaRPr lang="en-US"/>
           </a:p>
         </p:txBody>
@@ -6784,14 +6802,24 @@
           <a:bodyPr/>
           <a:lstStyle/>
           <a:p>
-            <a:endParaRPr lang="en-US"/>
+            <a:r>
+              <a:rPr lang="en-US" dirty="0" smtClean="0"/>
+              <a:t>When the amount of a member’s copays, deductibles and coinsurance exceed the Out-of-Pocket Maximum, the insurance company will pay all additional bills.</a:t>
+            </a:r>
+          </a:p>
+          <a:p>
+            <a:r>
+              <a:rPr lang="en-US" dirty="0" smtClean="0"/>
+              <a:t>This feature of the insurance policy is designed to prevent bankruptcies due to medical bills, by capping the total amount a member will pay in a given year.</a:t>
+            </a:r>
+            <a:endParaRPr lang="en-US" dirty="0"/>
           </a:p>
         </p:txBody>
       </p:sp>
     </p:spTree>
     <p:extLst>
       <p:ext uri="{BB962C8B-B14F-4D97-AF65-F5344CB8AC3E}">
-        <p14:creationId xmlns:p14="http://schemas.microsoft.com/office/powerpoint/2010/main" val="3324230771"/>
+        <p14:creationId xmlns:p14="http://schemas.microsoft.com/office/powerpoint/2010/main" val="3400448223"/>
       </p:ext>
     </p:extLst>
   </p:cSld>
@@ -6855,6 +6883,42 @@
         <p:txBody>
           <a:bodyPr/>
           <a:lstStyle/>
+          <a:p>
+            <a:r>
+              <a:rPr lang="en-US" dirty="0">
+                <a:hlinkClick r:id="rId2"/>
+              </a:rPr>
+              <a:t>http://</a:t>
+            </a:r>
+            <a:r>
+              <a:rPr lang="en-US" dirty="0" smtClean="0">
+                <a:hlinkClick r:id="rId2"/>
+              </a:rPr>
+              <a:t>www.hci3.org/thought-leadership/why-incentives-matter/capitation/capitation-models</a:t>
+            </a:r>
+            <a:endParaRPr lang="en-US" dirty="0" smtClean="0"/>
+          </a:p>
+          <a:p>
+            <a:r>
+              <a:rPr lang="en-US">
+                <a:hlinkClick r:id="rId3"/>
+              </a:rPr>
+              <a:t>https://</a:t>
+            </a:r>
+            <a:r>
+              <a:rPr lang="en-US">
+                <a:hlinkClick r:id="rId3"/>
+              </a:rPr>
+              <a:t>www.healthcare.gov/glossary</a:t>
+            </a:r>
+            <a:r>
+              <a:rPr lang="en-US" smtClean="0">
+                <a:hlinkClick r:id="rId3"/>
+              </a:rPr>
+              <a:t>/</a:t>
+            </a:r>
+            <a:endParaRPr lang="en-US" smtClean="0"/>
+          </a:p>
           <a:p>
             <a:endParaRPr lang="en-US" dirty="0"/>
           </a:p>
@@ -6907,7 +6971,7 @@
           <a:p>
             <a:r>
               <a:rPr lang="en-US" dirty="0" smtClean="0"/>
-              <a:t>Copays</a:t>
+              <a:t>Fee-for-Service Payments</a:t>
             </a:r>
             <a:endParaRPr lang="en-US" dirty="0"/>
           </a:p>
@@ -6927,6 +6991,18 @@
         <p:txBody>
           <a:bodyPr/>
           <a:lstStyle/>
+          <a:p>
+            <a:r>
+              <a:rPr lang="en-US" dirty="0" smtClean="0"/>
+              <a:t>This is the most common, and traditional, method of reimbursing providers.</a:t>
+            </a:r>
+          </a:p>
+          <a:p>
+            <a:r>
+              <a:rPr lang="en-US" dirty="0" smtClean="0"/>
+              <a:t>Providers are reimbursed for each medical test and procedure that a patient receives.</a:t>
+            </a:r>
+          </a:p>
           <a:p>
             <a:endParaRPr lang="en-US" dirty="0"/>
           </a:p>
@@ -6935,7 +7011,7 @@
     </p:spTree>
     <p:extLst>
       <p:ext uri="{BB962C8B-B14F-4D97-AF65-F5344CB8AC3E}">
-        <p14:creationId xmlns:p14="http://schemas.microsoft.com/office/powerpoint/2010/main" val="3205627481"/>
+        <p14:creationId xmlns:p14="http://schemas.microsoft.com/office/powerpoint/2010/main" val="3037392112"/>
       </p:ext>
     </p:extLst>
   </p:cSld>
@@ -6979,7 +7055,7 @@
           <a:p>
             <a:r>
               <a:rPr lang="en-US" dirty="0" smtClean="0"/>
-              <a:t>Deductibles</a:t>
+              <a:t>Bundled-Episode Payments</a:t>
             </a:r>
             <a:endParaRPr lang="en-US" dirty="0"/>
           </a:p>
@@ -7000,6 +7076,16 @@
           <a:bodyPr/>
           <a:lstStyle/>
           <a:p>
+            <a:r>
+              <a:rPr lang="en-US" dirty="0" smtClean="0"/>
+              <a:t>Providers are reimbursed based on the patients diagnosis.</a:t>
+            </a:r>
+          </a:p>
+          <a:p>
+            <a:r>
+              <a:rPr lang="en-US" dirty="0" smtClean="0"/>
+              <a:t>This payment method is common for maternity claims, where providers are paid a fixed amount for all services leading up to the delivery.</a:t>
+            </a:r>
             <a:endParaRPr lang="en-US" dirty="0"/>
           </a:p>
         </p:txBody>
@@ -7007,7 +7093,7 @@
     </p:spTree>
     <p:extLst>
       <p:ext uri="{BB962C8B-B14F-4D97-AF65-F5344CB8AC3E}">
-        <p14:creationId xmlns:p14="http://schemas.microsoft.com/office/powerpoint/2010/main" val="3400448223"/>
+        <p14:creationId xmlns:p14="http://schemas.microsoft.com/office/powerpoint/2010/main" val="574827814"/>
       </p:ext>
     </p:extLst>
   </p:cSld>
@@ -7051,7 +7137,7 @@
           <a:p>
             <a:r>
               <a:rPr lang="en-US" dirty="0" smtClean="0"/>
-              <a:t>Coinsurance</a:t>
+              <a:t>Capitations &amp; Global Payments</a:t>
             </a:r>
             <a:endParaRPr lang="en-US" dirty="0"/>
           </a:p>
@@ -7072,6 +7158,44 @@
           <a:bodyPr/>
           <a:lstStyle/>
           <a:p>
+            <a:r>
+              <a:rPr lang="en-US" dirty="0" smtClean="0"/>
+              <a:t>Providers are paid a fixed amount per member per month</a:t>
+            </a:r>
+          </a:p>
+          <a:p>
+            <a:r>
+              <a:rPr lang="en-US" dirty="0" smtClean="0"/>
+              <a:t>This payment covers all services provided to the member.</a:t>
+            </a:r>
+          </a:p>
+          <a:p>
+            <a:r>
+              <a:rPr lang="en-US" dirty="0" smtClean="0"/>
+              <a:t>Certain high-cost service, such as advanced imaging, may be carved-out of the </a:t>
+            </a:r>
+            <a:r>
+              <a:rPr lang="en-US" dirty="0" err="1" smtClean="0"/>
+              <a:t>capitaiton</a:t>
+            </a:r>
+            <a:r>
+              <a:rPr lang="en-US" dirty="0" smtClean="0"/>
+              <a:t> agreement.</a:t>
+            </a:r>
+          </a:p>
+          <a:p>
+            <a:r>
+              <a:rPr lang="en-US" dirty="0" smtClean="0"/>
+              <a:t>This type of payment model gives providers a strong incentive to reduce over-utilization and maximize </a:t>
+            </a:r>
+            <a:r>
+              <a:rPr lang="en-US" dirty="0" err="1" smtClean="0"/>
+              <a:t>preventitive</a:t>
+            </a:r>
+            <a:r>
+              <a:rPr lang="en-US" dirty="0" smtClean="0"/>
+              <a:t> care.</a:t>
+            </a:r>
             <a:endParaRPr lang="en-US" dirty="0"/>
           </a:p>
         </p:txBody>
@@ -7079,7 +7203,7 @@
     </p:spTree>
     <p:extLst>
       <p:ext uri="{BB962C8B-B14F-4D97-AF65-F5344CB8AC3E}">
-        <p14:creationId xmlns:p14="http://schemas.microsoft.com/office/powerpoint/2010/main" val="3400448223"/>
+        <p14:creationId xmlns:p14="http://schemas.microsoft.com/office/powerpoint/2010/main" val="706762548"/>
       </p:ext>
     </p:extLst>
   </p:cSld>
@@ -7122,10 +7246,10 @@
           <a:lstStyle/>
           <a:p>
             <a:r>
-              <a:rPr lang="en-US" smtClean="0"/>
-              <a:t>Out-of-Pocket Maximums</a:t>
-            </a:r>
-            <a:endParaRPr lang="en-US"/>
+              <a:rPr lang="en-US" dirty="0" smtClean="0"/>
+              <a:t>Billed Amount</a:t>
+            </a:r>
+            <a:endParaRPr lang="en-US" dirty="0"/>
           </a:p>
         </p:txBody>
       </p:sp>
@@ -7144,6 +7268,10 @@
           <a:bodyPr/>
           <a:lstStyle/>
           <a:p>
+            <a:r>
+              <a:rPr lang="en-US" dirty="0" smtClean="0"/>
+              <a:t>The amount the provider billed </a:t>
+            </a:r>
             <a:endParaRPr lang="en-US" dirty="0"/>
           </a:p>
         </p:txBody>
@@ -7151,7 +7279,7 @@
     </p:spTree>
     <p:extLst>
       <p:ext uri="{BB962C8B-B14F-4D97-AF65-F5344CB8AC3E}">
-        <p14:creationId xmlns:p14="http://schemas.microsoft.com/office/powerpoint/2010/main" val="3400448223"/>
+        <p14:creationId xmlns:p14="http://schemas.microsoft.com/office/powerpoint/2010/main" val="318706236"/>
       </p:ext>
     </p:extLst>
   </p:cSld>
@@ -7193,7 +7321,11 @@
           <a:bodyPr/>
           <a:lstStyle/>
           <a:p>
-            <a:endParaRPr lang="en-US"/>
+            <a:r>
+              <a:rPr lang="en-US" dirty="0" smtClean="0"/>
+              <a:t>Allowed Amount</a:t>
+            </a:r>
+            <a:endParaRPr lang="en-US" dirty="0"/>
           </a:p>
         </p:txBody>
       </p:sp>
@@ -7212,14 +7344,24 @@
           <a:bodyPr/>
           <a:lstStyle/>
           <a:p>
-            <a:endParaRPr lang="en-US"/>
+            <a:r>
+              <a:rPr lang="en-US" dirty="0" smtClean="0"/>
+              <a:t>The maximum amount the insurance organization has agreed to pay the provider for the services renders.</a:t>
+            </a:r>
+          </a:p>
+          <a:p>
+            <a:r>
+              <a:rPr lang="en-US" dirty="0" smtClean="0"/>
+              <a:t>The allowed amount is often substantially lower than the billed amount.</a:t>
+            </a:r>
+            <a:endParaRPr lang="en-US" dirty="0"/>
           </a:p>
         </p:txBody>
       </p:sp>
     </p:spTree>
     <p:extLst>
       <p:ext uri="{BB962C8B-B14F-4D97-AF65-F5344CB8AC3E}">
-        <p14:creationId xmlns:p14="http://schemas.microsoft.com/office/powerpoint/2010/main" val="543790671"/>
+        <p14:creationId xmlns:p14="http://schemas.microsoft.com/office/powerpoint/2010/main" val="1211210275"/>
       </p:ext>
     </p:extLst>
   </p:cSld>
@@ -7261,7 +7403,11 @@
           <a:bodyPr/>
           <a:lstStyle/>
           <a:p>
-            <a:endParaRPr lang="en-US"/>
+            <a:r>
+              <a:rPr lang="en-US" dirty="0" smtClean="0"/>
+              <a:t>Paid Amount</a:t>
+            </a:r>
+            <a:endParaRPr lang="en-US" dirty="0"/>
           </a:p>
         </p:txBody>
       </p:sp>
@@ -7280,14 +7426,37 @@
           <a:bodyPr/>
           <a:lstStyle/>
           <a:p>
-            <a:endParaRPr lang="en-US"/>
+            <a:r>
+              <a:rPr lang="en-US" dirty="0" smtClean="0"/>
+              <a:t>The amount actually paid by this insurance company.</a:t>
+            </a:r>
+          </a:p>
+          <a:p>
+            <a:r>
+              <a:rPr lang="en-US" dirty="0" smtClean="0"/>
+              <a:t>This amount excludes member cost sharing.</a:t>
+            </a:r>
+          </a:p>
+          <a:p>
+            <a:r>
+              <a:rPr lang="en-US" dirty="0" smtClean="0"/>
+              <a:t>For capitated claims, this amount may be entered as zero, or as the “fee-for-service equivalent”</a:t>
+            </a:r>
+          </a:p>
+          <a:p>
+            <a:pPr lvl="1"/>
+            <a:r>
+              <a:rPr lang="en-US" dirty="0" smtClean="0"/>
+              <a:t>Fee-for-service equivalent is a statistical value that represents the estimated amount the insurance organization would have paid if a capitated claim had been paid for under a fee-for-service agreement.</a:t>
+            </a:r>
+            <a:endParaRPr lang="en-US" dirty="0"/>
           </a:p>
         </p:txBody>
       </p:sp>
     </p:spTree>
     <p:extLst>
       <p:ext uri="{BB962C8B-B14F-4D97-AF65-F5344CB8AC3E}">
-        <p14:creationId xmlns:p14="http://schemas.microsoft.com/office/powerpoint/2010/main" val="3324230771"/>
+        <p14:creationId xmlns:p14="http://schemas.microsoft.com/office/powerpoint/2010/main" val="799888586"/>
       </p:ext>
     </p:extLst>
   </p:cSld>
@@ -7329,7 +7498,11 @@
           <a:bodyPr/>
           <a:lstStyle/>
           <a:p>
-            <a:endParaRPr lang="en-US"/>
+            <a:r>
+              <a:rPr lang="en-US" dirty="0" smtClean="0"/>
+              <a:t>Copays</a:t>
+            </a:r>
+            <a:endParaRPr lang="en-US" dirty="0"/>
           </a:p>
         </p:txBody>
       </p:sp>
@@ -7348,14 +7521,55 @@
           <a:bodyPr/>
           <a:lstStyle/>
           <a:p>
-            <a:endParaRPr lang="en-US"/>
+            <a:r>
+              <a:rPr lang="en-US" dirty="0" smtClean="0"/>
+              <a:t>Copays are out-of</a:t>
+            </a:r>
+            <a:r>
+              <a:rPr lang="en-US" dirty="0" smtClean="0"/>
+              <a:t>-pocket payments the member makes at the time of service</a:t>
+            </a:r>
+          </a:p>
+          <a:p>
+            <a:r>
+              <a:rPr lang="en-US" dirty="0" smtClean="0"/>
+              <a:t>Copays are an amount per office visit.  For example, a plan may charge:</a:t>
+            </a:r>
+          </a:p>
+          <a:p>
+            <a:pPr lvl="1"/>
+            <a:r>
+              <a:rPr lang="en-US" dirty="0" smtClean="0"/>
+              <a:t>A $20 copay for an office visit to a primary care physician</a:t>
+            </a:r>
+          </a:p>
+          <a:p>
+            <a:pPr lvl="1"/>
+            <a:r>
+              <a:rPr lang="en-US" dirty="0" smtClean="0"/>
+              <a:t>A $50 copay for an office visit to a specialist</a:t>
+            </a:r>
+          </a:p>
+          <a:p>
+            <a:pPr lvl="1"/>
+            <a:r>
+              <a:rPr lang="en-US" dirty="0" smtClean="0"/>
+              <a:t>A $500 copay for an emergency department visit</a:t>
+            </a:r>
+          </a:p>
+          <a:p>
+            <a:r>
+              <a:rPr lang="en-US" dirty="0" smtClean="0"/>
+              <a:t>Copays are designed to encourage members to choose the lowest-cost source of appropriate care.</a:t>
+            </a:r>
+            <a:endParaRPr lang="en-US" dirty="0"/>
           </a:p>
         </p:txBody>
       </p:sp>
     </p:spTree>
     <p:extLst>
       <p:ext uri="{BB962C8B-B14F-4D97-AF65-F5344CB8AC3E}">
-        <p14:creationId xmlns:p14="http://schemas.microsoft.com/office/powerpoint/2010/main" val="3324230771"/>
+        <p14:creationId xmlns:p14="http://schemas.microsoft.com/office/powerpoint/2010/main" val="3205627481"/>
       </p:ext>
     </p:extLst>
   </p:cSld>
@@ -7397,7 +7611,11 @@
           <a:bodyPr/>
           <a:lstStyle/>
           <a:p>
-            <a:endParaRPr lang="en-US"/>
+            <a:r>
+              <a:rPr lang="en-US" dirty="0" smtClean="0"/>
+              <a:t>Deductibles</a:t>
+            </a:r>
+            <a:endParaRPr lang="en-US" dirty="0"/>
           </a:p>
         </p:txBody>
       </p:sp>
@@ -7416,14 +7634,20 @@
           <a:bodyPr/>
           <a:lstStyle/>
           <a:p>
-            <a:endParaRPr lang="en-US"/>
+            <a:r>
+              <a:rPr lang="en-US" dirty="0" smtClean="0"/>
+              <a:t>Deductibles are the amount a member agrees to pay out of pocket before the insurance company will begin paying for medical services.</a:t>
+            </a:r>
+          </a:p>
+          <a:p>
+            <a:endParaRPr lang="en-US" dirty="0"/>
           </a:p>
         </p:txBody>
       </p:sp>
     </p:spTree>
     <p:extLst>
       <p:ext uri="{BB962C8B-B14F-4D97-AF65-F5344CB8AC3E}">
-        <p14:creationId xmlns:p14="http://schemas.microsoft.com/office/powerpoint/2010/main" val="3324230771"/>
+        <p14:creationId xmlns:p14="http://schemas.microsoft.com/office/powerpoint/2010/main" val="3400448223"/>
       </p:ext>
     </p:extLst>
   </p:cSld>
@@ -7933,7 +8157,7 @@
   <a:extraClrSchemeLst/>
   <a:extLst>
     <a:ext uri="{05A4C25C-085E-4340-85A3-A5531E510DB2}">
-      <thm15:themeFamily xmlns:thm15="http://schemas.microsoft.com/office/thememl/2012/main" xmlns="" name="Gallery" id="{BBFCD31E-59A1-489D-B089-A3EAD7CAE12E}" vid="{AC464412-510E-4F2B-8947-A0DDBD028997}"/>
+      <thm15:themeFamily xmlns="" xmlns:thm15="http://schemas.microsoft.com/office/thememl/2012/main" name="Gallery" id="{BBFCD31E-59A1-489D-B089-A3EAD7CAE12E}" vid="{AC464412-510E-4F2B-8947-A0DDBD028997}"/>
     </a:ext>
   </a:extLst>
 </a:theme>

</xml_diff>